<commit_message>
end of 9-lesson, in django.
</commit_message>
<xml_diff>
--- a/PDP-university-exams/1-kusr/2-semester/Final-exam/Firstsubmision/Soft_skills/007/soft_skills.pptx
+++ b/PDP-university-exams/1-kusr/2-semester/Final-exam/Firstsubmision/Soft_skills/007/soft_skills.pptx
@@ -229,7 +229,7 @@
           <a:p>
             <a:fld id="{80680FBE-A8DF-4758-9AC4-3A9E1039168F}" type="datetimeFigureOut">
               <a:rPr lang="en-US" smtClean="0"/>
-              <a:t>5/23/24</a:t>
+              <a:t>5/24/24</a:t>
             </a:fld>
             <a:endParaRPr lang="en-US" dirty="0"/>
           </a:p>
@@ -394,7 +394,7 @@
           <a:p>
             <a:fld id="{EC13577B-6902-467D-A26C-08A0DD5E4E03}" type="datetimeFigureOut">
               <a:rPr lang="en-US" smtClean="0"/>
-              <a:t>5/23/24</a:t>
+              <a:t>5/24/24</a:t>
             </a:fld>
             <a:endParaRPr lang="en-US" dirty="0"/>
           </a:p>
@@ -1212,7 +1212,7 @@
             <a:fld id="{8BEEBAAA-29B5-4AF5-BC5F-7E580C29002D}" type="datetimeFigureOut">
               <a:rPr lang="en-US" smtClean="0"/>
               <a:pPr/>
-              <a:t>5/23/24</a:t>
+              <a:t>5/24/24</a:t>
             </a:fld>
             <a:endParaRPr lang="en-US" dirty="0"/>
           </a:p>
@@ -1801,7 +1801,7 @@
             <a:fld id="{8BEEBAAA-29B5-4AF5-BC5F-7E580C29002D}" type="datetimeFigureOut">
               <a:rPr lang="en-US" smtClean="0"/>
               <a:pPr/>
-              <a:t>5/23/24</a:t>
+              <a:t>5/24/24</a:t>
             </a:fld>
             <a:endParaRPr lang="en-US" dirty="0"/>
           </a:p>
@@ -2329,21 +2329,8 @@
                   <a:srgbClr val="B7472A"/>
                 </a:solidFill>
               </a:rPr>
-              <a:t>Muxtorov </a:t>
-            </a:r>
-            <a:r>
-              <a:rPr lang="en-US" sz="2400" dirty="0" err="1">
-                <a:solidFill>
-                  <a:srgbClr val="B7472A"/>
-                </a:solidFill>
-              </a:rPr>
-              <a:t>Shaxzodbel</a:t>
-            </a:r>
-            <a:endParaRPr lang="en-US" sz="2400" dirty="0">
-              <a:solidFill>
-                <a:srgbClr val="B7472A"/>
-              </a:solidFill>
-            </a:endParaRPr>
+              <a:t>Muxtorov Shaxzodbek</a:t>
+            </a:r>
           </a:p>
           <a:p>
             <a:pPr marL="0" indent="0">
@@ -5206,7 +5193,69 @@
                 </a:solidFill>
                 <a:cs typeface="Segoe UI" panose="020B0502040204020203" pitchFamily="34" charset="0"/>
               </a:rPr>
-              <a:t>O’zbekistond</a:t>
+              <a:t>O’zbekiston</a:t>
+            </a:r>
+            <a:br>
+              <a:rPr lang="en-US" b="1" dirty="0">
+                <a:solidFill>
+                  <a:schemeClr val="tx1"/>
+                </a:solidFill>
+                <a:cs typeface="Segoe UI" panose="020B0502040204020203" pitchFamily="34" charset="0"/>
+              </a:rPr>
+            </a:br>
+            <a:r>
+              <a:rPr lang="en-US" dirty="0">
+                <a:solidFill>
+                  <a:schemeClr val="tx1"/>
+                </a:solidFill>
+                <a:cs typeface="Segoe UI" panose="020B0502040204020203" pitchFamily="34" charset="0"/>
+              </a:rPr>
+              <a:t>Bu ham </a:t>
+            </a:r>
+            <a:r>
+              <a:rPr lang="en-US" dirty="0" err="1">
+                <a:solidFill>
+                  <a:schemeClr val="tx1"/>
+                </a:solidFill>
+                <a:cs typeface="Segoe UI" panose="020B0502040204020203" pitchFamily="34" charset="0"/>
+              </a:rPr>
+              <a:t>bir</a:t>
+            </a:r>
+            <a:r>
+              <a:rPr lang="en-US" dirty="0">
+                <a:solidFill>
+                  <a:schemeClr val="tx1"/>
+                </a:solidFill>
+                <a:cs typeface="Segoe UI" panose="020B0502040204020203" pitchFamily="34" charset="0"/>
+              </a:rPr>
+              <a:t> </a:t>
+            </a:r>
+            <a:r>
+              <a:rPr lang="en-US" dirty="0" err="1">
+                <a:solidFill>
+                  <a:schemeClr val="tx1"/>
+                </a:solidFill>
+                <a:cs typeface="Segoe UI" panose="020B0502040204020203" pitchFamily="34" charset="0"/>
+              </a:rPr>
+              <a:t>qisqartma</a:t>
+            </a:r>
+            <a:r>
+              <a:rPr lang="en-US" dirty="0">
+                <a:solidFill>
+                  <a:schemeClr val="tx1"/>
+                </a:solidFill>
+                <a:cs typeface="Segoe UI" panose="020B0502040204020203" pitchFamily="34" charset="0"/>
+              </a:rPr>
+              <a:t> </a:t>
+            </a:r>
+            <a:r>
+              <a:rPr lang="en-US" dirty="0" err="1">
+                <a:solidFill>
+                  <a:schemeClr val="tx1"/>
+                </a:solidFill>
+                <a:cs typeface="Segoe UI" panose="020B0502040204020203" pitchFamily="34" charset="0"/>
+              </a:rPr>
+              <a:t>yozuv</a:t>
             </a:r>
             <a:endParaRPr lang="en-US" b="1" dirty="0">
               <a:solidFill>
@@ -6435,6 +6484,35 @@
 </file>
 
 <file path=customXml/item1.xml><?xml version="1.0" encoding="utf-8"?>
+<p:properties xmlns:p="http://schemas.microsoft.com/office/2006/metadata/properties" xmlns:xsi="http://www.w3.org/2001/XMLSchema-instance" xmlns:pc="http://schemas.microsoft.com/office/infopath/2007/PartnerControls">
+  <documentManagement>
+    <_ip_UnifiedCompliancePolicyUIAction xmlns="http://schemas.microsoft.com/sharepoint/v3" xsi:nil="true"/>
+    <Image xmlns="71af3243-3dd4-4a8d-8c0d-dd76da1f02a5">
+      <Url xsi:nil="true"/>
+      <Description xsi:nil="true"/>
+    </Image>
+    <Status xmlns="71af3243-3dd4-4a8d-8c0d-dd76da1f02a5">Not started</Status>
+    <Background xmlns="71af3243-3dd4-4a8d-8c0d-dd76da1f02a5">false</Background>
+    <_ip_UnifiedCompliancePolicyProperties xmlns="http://schemas.microsoft.com/sharepoint/v3" xsi:nil="true"/>
+    <ImageTagsTaxHTField xmlns="71af3243-3dd4-4a8d-8c0d-dd76da1f02a5">
+      <Terms xmlns="http://schemas.microsoft.com/office/infopath/2007/PartnerControls"/>
+    </ImageTagsTaxHTField>
+    <TaxCatchAll xmlns="230e9df3-be65-4c73-a93b-d1236ebd677e" xsi:nil="true"/>
+    <MediaServiceKeyPoints xmlns="71af3243-3dd4-4a8d-8c0d-dd76da1f02a5" xsi:nil="true"/>
+  </documentManagement>
+</p:properties>
+</file>
+
+<file path=customXml/item2.xml><?xml version="1.0" encoding="utf-8"?>
+<?mso-contentType ?>
+<FormTemplates xmlns="http://schemas.microsoft.com/sharepoint/v3/contenttype/forms">
+  <Display>DocumentLibraryForm</Display>
+  <Edit>DocumentLibraryForm</Edit>
+  <New>DocumentLibraryForm</New>
+</FormTemplates>
+</file>
+
+<file path=customXml/item3.xml><?xml version="1.0" encoding="utf-8"?>
 <ct:contentTypeSchema xmlns:ct="http://schemas.microsoft.com/office/2006/metadata/contentType" xmlns:ma="http://schemas.microsoft.com/office/2006/metadata/properties/metaAttributes" ct:_="" ma:_="" ma:contentTypeName="Document" ma:contentTypeID="0x01010079F111ED35F8CC479449609E8A0923A6" ma:contentTypeVersion="24" ma:contentTypeDescription="Create a new document." ma:contentTypeScope="" ma:versionID="2d714a3296df14eba7a100bb665443ca">
   <xsd:schema xmlns:xsd="http://www.w3.org/2001/XMLSchema" xmlns:xs="http://www.w3.org/2001/XMLSchema" xmlns:p="http://schemas.microsoft.com/office/2006/metadata/properties" xmlns:ns1="http://schemas.microsoft.com/sharepoint/v3" xmlns:ns2="71af3243-3dd4-4a8d-8c0d-dd76da1f02a5" xmlns:ns3="16c05727-aa75-4e4a-9b5f-8a80a1165891" xmlns:ns4="230e9df3-be65-4c73-a93b-d1236ebd677e" targetNamespace="http://schemas.microsoft.com/office/2006/metadata/properties" ma:root="true" ma:fieldsID="49549bf45bfbbfb6cffed527380e77e1" ns1:_="" ns2:_="" ns3:_="" ns4:_="">
     <xsd:import namespace="http://schemas.microsoft.com/sharepoint/v3"/>
@@ -6722,36 +6800,27 @@
 </ct:contentTypeSchema>
 </file>
 
-<file path=customXml/item2.xml><?xml version="1.0" encoding="utf-8"?>
-<?mso-contentType ?>
-<FormTemplates xmlns="http://schemas.microsoft.com/sharepoint/v3/contenttype/forms">
-  <Display>DocumentLibraryForm</Display>
-  <Edit>DocumentLibraryForm</Edit>
-  <New>DocumentLibraryForm</New>
-</FormTemplates>
+<file path=customXml/itemProps1.xml><?xml version="1.0" encoding="utf-8"?>
+<ds:datastoreItem xmlns:ds="http://schemas.openxmlformats.org/officeDocument/2006/customXml" ds:itemID="{417A7A50-AAC8-434E-833F-7E27C6AD43E0}">
+  <ds:schemaRefs>
+    <ds:schemaRef ds:uri="http://schemas.microsoft.com/office/2006/metadata/properties"/>
+    <ds:schemaRef ds:uri="http://schemas.microsoft.com/office/infopath/2007/PartnerControls"/>
+    <ds:schemaRef ds:uri="http://schemas.microsoft.com/sharepoint/v3"/>
+    <ds:schemaRef ds:uri="71af3243-3dd4-4a8d-8c0d-dd76da1f02a5"/>
+    <ds:schemaRef ds:uri="230e9df3-be65-4c73-a93b-d1236ebd677e"/>
+  </ds:schemaRefs>
+</ds:datastoreItem>
 </file>
 
-<file path=customXml/item3.xml><?xml version="1.0" encoding="utf-8"?>
-<p:properties xmlns:p="http://schemas.microsoft.com/office/2006/metadata/properties" xmlns:xsi="http://www.w3.org/2001/XMLSchema-instance" xmlns:pc="http://schemas.microsoft.com/office/infopath/2007/PartnerControls">
-  <documentManagement>
-    <_ip_UnifiedCompliancePolicyUIAction xmlns="http://schemas.microsoft.com/sharepoint/v3" xsi:nil="true"/>
-    <Image xmlns="71af3243-3dd4-4a8d-8c0d-dd76da1f02a5">
-      <Url xsi:nil="true"/>
-      <Description xsi:nil="true"/>
-    </Image>
-    <Status xmlns="71af3243-3dd4-4a8d-8c0d-dd76da1f02a5">Not started</Status>
-    <Background xmlns="71af3243-3dd4-4a8d-8c0d-dd76da1f02a5">false</Background>
-    <_ip_UnifiedCompliancePolicyProperties xmlns="http://schemas.microsoft.com/sharepoint/v3" xsi:nil="true"/>
-    <ImageTagsTaxHTField xmlns="71af3243-3dd4-4a8d-8c0d-dd76da1f02a5">
-      <Terms xmlns="http://schemas.microsoft.com/office/infopath/2007/PartnerControls"/>
-    </ImageTagsTaxHTField>
-    <TaxCatchAll xmlns="230e9df3-be65-4c73-a93b-d1236ebd677e" xsi:nil="true"/>
-    <MediaServiceKeyPoints xmlns="71af3243-3dd4-4a8d-8c0d-dd76da1f02a5" xsi:nil="true"/>
-  </documentManagement>
-</p:properties>
+<file path=customXml/itemProps2.xml><?xml version="1.0" encoding="utf-8"?>
+<ds:datastoreItem xmlns:ds="http://schemas.openxmlformats.org/officeDocument/2006/customXml" ds:itemID="{DC8AD12E-C2D9-41B2-8612-466D65B53646}">
+  <ds:schemaRefs>
+    <ds:schemaRef ds:uri="http://schemas.microsoft.com/sharepoint/v3/contenttype/forms"/>
+  </ds:schemaRefs>
+</ds:datastoreItem>
 </file>
 
-<file path=customXml/itemProps1.xml><?xml version="1.0" encoding="utf-8"?>
+<file path=customXml/itemProps3.xml><?xml version="1.0" encoding="utf-8"?>
 <ds:datastoreItem xmlns:ds="http://schemas.openxmlformats.org/officeDocument/2006/customXml" ds:itemID="{182A8BBB-9391-4155-A1BE-AA1B761FAA83}">
   <ds:schemaRefs>
     <ds:schemaRef ds:uri="http://schemas.microsoft.com/office/2006/metadata/contentType"/>
@@ -6770,24 +6839,4 @@
     <ds:schemaRef ds:uri="http://schemas.microsoft.com/internal/obd"/>
   </ds:schemaRefs>
 </ds:datastoreItem>
-</file>
-
-<file path=customXml/itemProps2.xml><?xml version="1.0" encoding="utf-8"?>
-<ds:datastoreItem xmlns:ds="http://schemas.openxmlformats.org/officeDocument/2006/customXml" ds:itemID="{DC8AD12E-C2D9-41B2-8612-466D65B53646}">
-  <ds:schemaRefs>
-    <ds:schemaRef ds:uri="http://schemas.microsoft.com/sharepoint/v3/contenttype/forms"/>
-  </ds:schemaRefs>
-</ds:datastoreItem>
-</file>
-
-<file path=customXml/itemProps3.xml><?xml version="1.0" encoding="utf-8"?>
-<ds:datastoreItem xmlns:ds="http://schemas.openxmlformats.org/officeDocument/2006/customXml" ds:itemID="{417A7A50-AAC8-434E-833F-7E27C6AD43E0}">
-  <ds:schemaRefs>
-    <ds:schemaRef ds:uri="http://schemas.microsoft.com/office/2006/metadata/properties"/>
-    <ds:schemaRef ds:uri="http://schemas.microsoft.com/office/infopath/2007/PartnerControls"/>
-    <ds:schemaRef ds:uri="http://schemas.microsoft.com/sharepoint/v3"/>
-    <ds:schemaRef ds:uri="71af3243-3dd4-4a8d-8c0d-dd76da1f02a5"/>
-    <ds:schemaRef ds:uri="230e9df3-be65-4c73-a93b-d1236ebd677e"/>
-  </ds:schemaRefs>
-</ds:datastoreItem>
 </file>
</xml_diff>